<commit_message>
Update to ApacheCon slide deck
</commit_message>
<xml_diff>
--- a/2017_APACHECON_US/ConSchedAndSbSChangeCloud-PDF.pptx
+++ b/2017_APACHECON_US/ConSchedAndSbSChangeCloud-PDF.pptx
@@ -5654,7 +5654,7 @@
                   <a:schemeClr val="bg1"/>
                 </a:buClr>
               </a:pPr>
-              <a:t>4/24/17</a:t>
+              <a:t>4/25/17</a:t>
             </a:fld>
             <a:endParaRPr lang="en-US" sz="900" dirty="0" smtClean="0">
               <a:solidFill>
@@ -5728,7 +5728,7 @@
                   <a:schemeClr val="bg1"/>
                 </a:buClr>
               </a:pPr>
-              <a:t>4/24/17</a:t>
+              <a:t>4/25/17</a:t>
             </a:fld>
             <a:endParaRPr lang="en-US" sz="900" dirty="0" smtClean="0">
               <a:solidFill>
@@ -8206,7 +8206,7 @@
         <p:spPr>
           <a:xfrm>
             <a:off x="1738704" y="1110798"/>
-            <a:ext cx="5489409" cy="3787774"/>
+            <a:ext cx="5489408" cy="3787774"/>
           </a:xfrm>
         </p:spPr>
       </p:pic>
@@ -8274,7 +8274,18 @@
           <a:p>
             <a:r>
               <a:rPr lang="en-US" dirty="0" smtClean="0"/>
-              <a:t>Schedulers and Software Defined Storage</a:t>
+              <a:t>Schedulers </a:t>
+            </a:r>
+            <a:r>
+              <a:rPr lang="en-US" dirty="0" smtClean="0"/>
+              <a:t>and</a:t>
+            </a:r>
+            <a:br>
+              <a:rPr lang="en-US" dirty="0" smtClean="0"/>
+            </a:br>
+            <a:r>
+              <a:rPr lang="en-US" dirty="0" smtClean="0"/>
+              <a:t>Software-based Storage</a:t>
             </a:r>
             <a:endParaRPr lang="en-US" dirty="0"/>
           </a:p>
@@ -8367,15 +8378,7 @@
           <a:p>
             <a:r>
               <a:rPr lang="en-US" dirty="0" smtClean="0"/>
-              <a:t>Let’s create a </a:t>
-            </a:r>
-            <a:r>
-              <a:rPr lang="en-US" dirty="0" smtClean="0"/>
-              <a:t>Software-based </a:t>
-            </a:r>
-            <a:r>
-              <a:rPr lang="en-US" dirty="0" smtClean="0"/>
-              <a:t>Storage Framework</a:t>
+              <a:t>Let’s create a Software-based Storage Framework</a:t>
             </a:r>
           </a:p>
           <a:p>
@@ -10145,7 +10148,7 @@
           <a:p>
             <a:r>
               <a:rPr lang="en-US" dirty="0" smtClean="0"/>
-              <a:t>External Storage Enablement</a:t>
+              <a:t>Manages the Storage Enablement</a:t>
             </a:r>
             <a:endParaRPr lang="en-US" dirty="0"/>
           </a:p>
@@ -10193,7 +10196,23 @@
             <a:pPr lvl="1"/>
             <a:r>
               <a:rPr lang="en-US" dirty="0" smtClean="0"/>
-              <a:t>AWS, GCE, ScaleIO, </a:t>
+              <a:t>AWS, Azure, </a:t>
+            </a:r>
+            <a:r>
+              <a:rPr lang="en-US" dirty="0" err="1" smtClean="0"/>
+              <a:t>Ceph</a:t>
+            </a:r>
+            <a:r>
+              <a:rPr lang="en-US" dirty="0" smtClean="0"/>
+              <a:t>, </a:t>
+            </a:r>
+            <a:r>
+              <a:rPr lang="en-US" dirty="0" err="1" smtClean="0"/>
+              <a:t>DigitalOcean</a:t>
+            </a:r>
+            <a:r>
+              <a:rPr lang="en-US" dirty="0" smtClean="0"/>
+              <a:t>, GCE, ScaleIO, </a:t>
             </a:r>
             <a:r>
               <a:rPr lang="en-US" dirty="0" err="1" smtClean="0"/>
@@ -10648,13 +10667,11 @@
           <a:p>
             <a:r>
               <a:rPr lang="en-US" dirty="0" smtClean="0"/>
-              <a:t>Applications with management APIs</a:t>
-            </a:r>
-          </a:p>
-          <a:p>
-            <a:r>
-              <a:rPr lang="en-US" dirty="0" smtClean="0"/>
-              <a:t>Cloud is perfect to enable DevOps</a:t>
+              <a:t>Cloud </a:t>
+            </a:r>
+            <a:r>
+              <a:rPr lang="en-US" dirty="0" smtClean="0"/>
+              <a:t>is perfect to enable DevOps</a:t>
             </a:r>
           </a:p>
           <a:p>
@@ -10688,7 +10705,7 @@
         </p:blipFill>
         <p:spPr>
           <a:xfrm>
-            <a:off x="2673350" y="2822574"/>
+            <a:off x="2662718" y="2386639"/>
             <a:ext cx="3803650" cy="1901825"/>
           </a:xfrm>
           <a:prstGeom prst="rect">
@@ -10917,28 +10934,34 @@
         </p:spPr>
         <p:txBody>
           <a:bodyPr>
-            <a:normAutofit lnSpcReduction="10000"/>
+            <a:normAutofit fontScale="92500" lnSpcReduction="10000"/>
           </a:bodyPr>
           <a:lstStyle/>
           <a:p>
             <a:r>
               <a:rPr lang="en-US" dirty="0" smtClean="0"/>
-              <a:t>AWS SDK</a:t>
-            </a:r>
+              <a:t>Software-based </a:t>
+            </a:r>
+            <a:r>
+              <a:rPr lang="en-US" dirty="0" smtClean="0"/>
+              <a:t>Storage Platform with a Cloud Platform driven by </a:t>
+            </a:r>
+            <a:r>
+              <a:rPr lang="en-US" dirty="0" smtClean="0"/>
+              <a:t>APIs</a:t>
+            </a:r>
+          </a:p>
+          <a:p>
+            <a:pPr lvl="1"/>
             <a:r>
               <a:rPr lang="en-US" dirty="0"/>
-              <a:t> </a:t>
-            </a:r>
-            <a:r>
-              <a:rPr lang="en-US" dirty="0" smtClean="0"/>
-              <a:t>– 10 Language bindings</a:t>
-            </a:r>
-          </a:p>
-          <a:p>
-            <a:r>
-              <a:rPr lang="en-US" dirty="0" smtClean="0"/>
-              <a:t>Software-based Storage Platform with a Cloud Platform driven by APIs</a:t>
-            </a:r>
+              <a:t>AWS SDK – 10 Language </a:t>
+            </a:r>
+            <a:r>
+              <a:rPr lang="en-US" dirty="0" smtClean="0"/>
+              <a:t>bindings</a:t>
+            </a:r>
+            <a:endParaRPr lang="en-US" dirty="0" smtClean="0"/>
           </a:p>
           <a:p>
             <a:r>
@@ -10949,23 +10972,32 @@
           <a:p>
             <a:pPr lvl="1"/>
             <a:r>
-              <a:rPr lang="en-US" dirty="0" smtClean="0"/>
-              <a:t>Maintenance, Remediation, Performance, </a:t>
-            </a:r>
-            <a:r>
-              <a:rPr lang="en-US" dirty="0" err="1" smtClean="0"/>
-              <a:t>etc</a:t>
-            </a:r>
-            <a:endParaRPr lang="en-US" dirty="0" smtClean="0"/>
-          </a:p>
-          <a:p>
-            <a:r>
               <a:rPr lang="en-US" dirty="0"/>
-              <a:t>S</a:t>
-            </a:r>
-            <a:r>
-              <a:rPr lang="en-US" dirty="0" smtClean="0"/>
-              <a:t>elf-aware applications! </a:t>
+              <a:t>Auto-scale Instances</a:t>
+            </a:r>
+          </a:p>
+          <a:p>
+            <a:pPr lvl="1"/>
+            <a:r>
+              <a:rPr lang="en-US" dirty="0"/>
+              <a:t>Dial in the IOPS for disk</a:t>
+            </a:r>
+          </a:p>
+          <a:p>
+            <a:pPr lvl="1"/>
+            <a:r>
+              <a:rPr lang="en-US" dirty="0"/>
+              <a:t>Possibilities are endless!</a:t>
+            </a:r>
+          </a:p>
+          <a:p>
+            <a:r>
+              <a:rPr lang="en-US" dirty="0" smtClean="0"/>
+              <a:t>Self-aware </a:t>
+            </a:r>
+            <a:r>
+              <a:rPr lang="en-US" dirty="0" smtClean="0"/>
+              <a:t>applications! </a:t>
             </a:r>
             <a:r>
               <a:rPr lang="en-US" dirty="0" err="1" smtClean="0"/>
@@ -13602,20 +13634,13 @@
         <p:spPr/>
         <p:txBody>
           <a:bodyPr>
-            <a:normAutofit fontScale="90000"/>
+            <a:normAutofit/>
           </a:bodyPr>
           <a:lstStyle/>
           <a:p>
             <a:r>
               <a:rPr lang="en-US" dirty="0" smtClean="0"/>
-              <a:t>Container</a:t>
-            </a:r>
-            <a:br>
-              <a:rPr lang="en-US" dirty="0" smtClean="0"/>
-            </a:br>
-            <a:r>
-              <a:rPr lang="en-US" dirty="0" smtClean="0"/>
-              <a:t>Schedulers</a:t>
+              <a:t>Container Schedulers</a:t>
             </a:r>
             <a:endParaRPr lang="en-US" dirty="0"/>
           </a:p>

</xml_diff>